<commit_message>
Added the initial version of the CUDA-OpenGL Engine.
</commit_message>
<xml_diff>
--- a/article/Exploring Ray-Space Hierarchy on the GPU for Ray-Tracing.pptx
+++ b/article/Exploring Ray-Space Hierarchy on the GPU for Ray-Tracing.pptx
@@ -5,7 +5,7 @@
     <p:sldMasterId id="2147483689" r:id="rId1"/>
   </p:sldMasterIdLst>
   <p:notesMasterIdLst>
-    <p:notesMasterId r:id="rId37"/>
+    <p:notesMasterId r:id="rId38"/>
   </p:notesMasterIdLst>
   <p:sldIdLst>
     <p:sldId id="256" r:id="rId2"/>
@@ -43,6 +43,7 @@
     <p:sldId id="278" r:id="rId34"/>
     <p:sldId id="296" r:id="rId35"/>
     <p:sldId id="297" r:id="rId36"/>
+    <p:sldId id="298" r:id="rId37"/>
   </p:sldIdLst>
   <p:sldSz cx="12192000" cy="6858000"/>
   <p:notesSz cx="6858000" cy="9144000"/>
@@ -231,7 +232,7 @@
           <a:p>
             <a:fld id="{0808BE82-006A-47EF-AD4C-2A4237F6F771}" type="datetimeFigureOut">
               <a:rPr lang="pt-PT" smtClean="0"/>
-              <a:t>01/02/2015</a:t>
+              <a:t>02/02/2015</a:t>
             </a:fld>
             <a:endParaRPr lang="pt-PT"/>
           </a:p>
@@ -1305,7 +1306,7 @@
           <a:p>
             <a:fld id="{546F9B3F-5A88-47A2-BD25-698CFA936B45}" type="datetime1">
               <a:rPr lang="pt-PT" smtClean="0"/>
-              <a:t>01/02/2015</a:t>
+              <a:t>02/02/2015</a:t>
             </a:fld>
             <a:endParaRPr lang="pt-PT"/>
           </a:p>
@@ -1556,7 +1557,7 @@
           <a:p>
             <a:fld id="{31ACC3C2-0A04-4094-B7AC-836904C4B00A}" type="datetime1">
               <a:rPr lang="pt-PT" smtClean="0"/>
-              <a:t>01/02/2015</a:t>
+              <a:t>02/02/2015</a:t>
             </a:fld>
             <a:endParaRPr lang="pt-PT"/>
           </a:p>
@@ -1870,7 +1871,7 @@
           <a:p>
             <a:fld id="{48B1A220-A711-4873-9020-C72E5D313222}" type="datetime1">
               <a:rPr lang="pt-PT" smtClean="0"/>
-              <a:t>01/02/2015</a:t>
+              <a:t>02/02/2015</a:t>
             </a:fld>
             <a:endParaRPr lang="pt-PT"/>
           </a:p>
@@ -2211,7 +2212,7 @@
           <a:p>
             <a:fld id="{6597DB6E-238A-4CB6-AA16-30A329E26422}" type="datetime1">
               <a:rPr lang="pt-PT" smtClean="0"/>
-              <a:t>01/02/2015</a:t>
+              <a:t>02/02/2015</a:t>
             </a:fld>
             <a:endParaRPr lang="pt-PT"/>
           </a:p>
@@ -2525,7 +2526,7 @@
           <a:p>
             <a:fld id="{468924F0-82DA-4FB0-A1C3-F17544732EEB}" type="datetime1">
               <a:rPr lang="pt-PT" smtClean="0"/>
-              <a:t>01/02/2015</a:t>
+              <a:t>02/02/2015</a:t>
             </a:fld>
             <a:endParaRPr lang="pt-PT"/>
           </a:p>
@@ -2918,7 +2919,7 @@
           <a:p>
             <a:fld id="{21B859AF-0D05-4217-A724-5C32B5717CE8}" type="datetime1">
               <a:rPr lang="pt-PT" smtClean="0"/>
-              <a:t>01/02/2015</a:t>
+              <a:t>02/02/2015</a:t>
             </a:fld>
             <a:endParaRPr lang="pt-PT"/>
           </a:p>
@@ -3088,7 +3089,7 @@
           <a:p>
             <a:fld id="{D3280129-FB8B-4FD5-81FB-CEB38245B323}" type="datetime1">
               <a:rPr lang="pt-PT" smtClean="0"/>
-              <a:t>01/02/2015</a:t>
+              <a:t>02/02/2015</a:t>
             </a:fld>
             <a:endParaRPr lang="pt-PT"/>
           </a:p>
@@ -3268,7 +3269,7 @@
           <a:p>
             <a:fld id="{287E9E47-F545-4FA6-A4AA-65586C42D595}" type="datetime1">
               <a:rPr lang="pt-PT" smtClean="0"/>
-              <a:t>01/02/2015</a:t>
+              <a:t>02/02/2015</a:t>
             </a:fld>
             <a:endParaRPr lang="pt-PT"/>
           </a:p>
@@ -3444,7 +3445,7 @@
           <a:p>
             <a:fld id="{827DDD23-BB14-4F5D-99CD-615502E2727A}" type="datetime1">
               <a:rPr lang="pt-PT" smtClean="0"/>
-              <a:t>01/02/2015</a:t>
+              <a:t>02/02/2015</a:t>
             </a:fld>
             <a:endParaRPr lang="pt-PT"/>
           </a:p>
@@ -3691,7 +3692,7 @@
           <a:p>
             <a:fld id="{DA4BC5E9-2AF4-4614-9B08-C4D4A259F6DF}" type="datetime1">
               <a:rPr lang="pt-PT" smtClean="0"/>
-              <a:t>01/02/2015</a:t>
+              <a:t>02/02/2015</a:t>
             </a:fld>
             <a:endParaRPr lang="pt-PT"/>
           </a:p>
@@ -3923,7 +3924,7 @@
           <a:p>
             <a:fld id="{B112AC56-2237-49F2-BA1B-33E3D9ACF137}" type="datetime1">
               <a:rPr lang="pt-PT" smtClean="0"/>
-              <a:t>01/02/2015</a:t>
+              <a:t>02/02/2015</a:t>
             </a:fld>
             <a:endParaRPr lang="pt-PT"/>
           </a:p>
@@ -4297,7 +4298,7 @@
           <a:p>
             <a:fld id="{4A9509B3-2F5E-4119-9D75-C3EFBF621D49}" type="datetime1">
               <a:rPr lang="pt-PT" smtClean="0"/>
-              <a:t>01/02/2015</a:t>
+              <a:t>02/02/2015</a:t>
             </a:fld>
             <a:endParaRPr lang="pt-PT"/>
           </a:p>
@@ -4420,7 +4421,7 @@
           <a:p>
             <a:fld id="{224CC3EF-28E7-43A2-A6D5-B629D33C7F74}" type="datetime1">
               <a:rPr lang="pt-PT" smtClean="0"/>
-              <a:t>01/02/2015</a:t>
+              <a:t>02/02/2015</a:t>
             </a:fld>
             <a:endParaRPr lang="pt-PT"/>
           </a:p>
@@ -4515,7 +4516,7 @@
           <a:p>
             <a:fld id="{821B421F-763E-4A3B-A47D-1B6FC42960D9}" type="datetime1">
               <a:rPr lang="pt-PT" smtClean="0"/>
-              <a:t>01/02/2015</a:t>
+              <a:t>02/02/2015</a:t>
             </a:fld>
             <a:endParaRPr lang="pt-PT"/>
           </a:p>
@@ -4770,7 +4771,7 @@
           <a:p>
             <a:fld id="{44A7A367-1A11-4A2C-8F3A-14A4C2C45A26}" type="datetime1">
               <a:rPr lang="pt-PT" smtClean="0"/>
-              <a:t>01/02/2015</a:t>
+              <a:t>02/02/2015</a:t>
             </a:fld>
             <a:endParaRPr lang="pt-PT"/>
           </a:p>
@@ -5033,7 +5034,7 @@
           <a:p>
             <a:fld id="{A21B7007-5A4F-4E7C-A01C-A4D98E492856}" type="datetime1">
               <a:rPr lang="pt-PT" smtClean="0"/>
-              <a:t>01/02/2015</a:t>
+              <a:t>02/02/2015</a:t>
             </a:fld>
             <a:endParaRPr lang="pt-PT"/>
           </a:p>
@@ -5776,7 +5777,7 @@
           <a:p>
             <a:fld id="{44815582-F1DB-4195-93A7-CDBD9A84D48D}" type="datetime1">
               <a:rPr lang="pt-PT" smtClean="0"/>
-              <a:t>01/02/2015</a:t>
+              <a:t>02/02/2015</a:t>
             </a:fld>
             <a:endParaRPr lang="pt-PT"/>
           </a:p>
@@ -6420,6 +6421,13 @@
   <p:clrMapOvr>
     <a:masterClrMapping/>
   </p:clrMapOvr>
+  <p:timing>
+    <p:tnLst>
+      <p:par>
+        <p:cTn id="1" dur="indefinite" restart="never" nodeType="tmRoot"/>
+      </p:par>
+    </p:tnLst>
+  </p:timing>
 </p:sld>
 </file>
 
@@ -6504,7 +6512,11 @@
             </a:pPr>
             <a:r>
               <a:rPr lang="pt-PT" dirty="0" smtClean="0"/>
-              <a:t>Introduzido por James Arvo e David Kirk em 1987.</a:t>
+              <a:t>Apresentado por </a:t>
+            </a:r>
+            <a:r>
+              <a:rPr lang="pt-PT" dirty="0" smtClean="0"/>
+              <a:t>James Arvo e David Kirk em 1987.</a:t>
             </a:r>
           </a:p>
           <a:p>
@@ -6717,8 +6729,8 @@
               <a:buChar char="•"/>
             </a:pPr>
             <a:r>
-              <a:rPr lang="pt-PT" dirty="0" smtClean="0"/>
-              <a:t>Introduzido por </a:t>
+              <a:rPr lang="pt-PT" dirty="0"/>
+              <a:t>Apresentado por </a:t>
             </a:r>
             <a:r>
               <a:rPr lang="en-US" dirty="0"/>
@@ -6861,7 +6873,7 @@
         </p:spPr>
         <p:txBody>
           <a:bodyPr>
-            <a:normAutofit/>
+            <a:normAutofit lnSpcReduction="10000"/>
           </a:bodyPr>
           <a:lstStyle/>
           <a:p>
@@ -6897,8 +6909,12 @@
               <a:buChar char="•"/>
             </a:pPr>
             <a:r>
+              <a:rPr lang="pt-PT" dirty="0"/>
+              <a:t>Apresentado por </a:t>
+            </a:r>
+            <a:r>
               <a:rPr lang="pt-PT" dirty="0" smtClean="0"/>
-              <a:t>Introduzido por D. Roger </a:t>
+              <a:t>D. Roger </a:t>
             </a:r>
             <a:r>
               <a:rPr lang="pt-PT" dirty="0" err="1" smtClean="0"/>
@@ -7151,8 +7167,8 @@
               <a:buChar char="•"/>
             </a:pPr>
             <a:r>
-              <a:rPr lang="pt-PT" dirty="0" smtClean="0"/>
-              <a:t>Introduzido por </a:t>
+              <a:rPr lang="pt-PT" dirty="0"/>
+              <a:t>Apresentado por </a:t>
             </a:r>
             <a:r>
               <a:rPr lang="pt-PT" dirty="0" err="1" smtClean="0"/>
@@ -8120,6 +8136,13 @@
   <p:clrMapOvr>
     <a:masterClrMapping/>
   </p:clrMapOvr>
+  <p:timing>
+    <p:tnLst>
+      <p:par>
+        <p:cTn id="1" dur="indefinite" restart="never" nodeType="tmRoot"/>
+      </p:par>
+    </p:tnLst>
+  </p:timing>
 </p:sld>
 </file>
 
@@ -8257,6 +8280,13 @@
   <p:clrMapOvr>
     <a:masterClrMapping/>
   </p:clrMapOvr>
+  <p:timing>
+    <p:tnLst>
+      <p:par>
+        <p:cTn id="1" dur="indefinite" restart="never" nodeType="tmRoot"/>
+      </p:par>
+    </p:tnLst>
+  </p:timing>
 </p:sld>
 </file>
 
@@ -8398,6 +8428,13 @@
   <p:clrMapOvr>
     <a:masterClrMapping/>
   </p:clrMapOvr>
+  <p:timing>
+    <p:tnLst>
+      <p:par>
+        <p:cTn id="1" dur="indefinite" restart="never" nodeType="tmRoot"/>
+      </p:par>
+    </p:tnLst>
+  </p:timing>
 </p:sld>
 </file>
 
@@ -8535,6 +8572,13 @@
   <p:clrMapOvr>
     <a:masterClrMapping/>
   </p:clrMapOvr>
+  <p:timing>
+    <p:tnLst>
+      <p:par>
+        <p:cTn id="1" dur="indefinite" restart="never" nodeType="tmRoot"/>
+      </p:par>
+    </p:tnLst>
+  </p:timing>
 </p:sld>
 </file>
 
@@ -10514,6 +10558,13 @@
   <p:clrMapOvr>
     <a:masterClrMapping/>
   </p:clrMapOvr>
+  <p:timing>
+    <p:tnLst>
+      <p:par>
+        <p:cTn id="1" dur="indefinite" restart="never" nodeType="tmRoot"/>
+      </p:par>
+    </p:tnLst>
+  </p:timing>
 </p:sld>
 </file>
 
@@ -10954,8 +11005,16 @@
               <a:buChar char="•"/>
             </a:pPr>
             <a:r>
+              <a:rPr lang="pt-PT" smtClean="0"/>
+              <a:t>O </a:t>
+            </a:r>
+            <a:r>
+              <a:rPr lang="pt-PT" smtClean="0"/>
+              <a:t>grande objetivo </a:t>
+            </a:r>
+            <a:r>
               <a:rPr lang="pt-PT" dirty="0" smtClean="0"/>
-              <a:t>O objetivo da ordenação de raios do trabalho de </a:t>
+              <a:t>da ordenação de raios do trabalho de </a:t>
             </a:r>
             <a:r>
               <a:rPr lang="pt-PT" dirty="0" err="1" smtClean="0"/>
@@ -10981,16 +11040,29 @@
             </a:pPr>
             <a:r>
               <a:rPr lang="pt-PT" dirty="0" smtClean="0"/>
-              <a:t>Adaptando a sua abordagem à hierarquia de Roger </a:t>
-            </a:r>
-            <a:r>
-              <a:rPr lang="pt-PT" dirty="0" err="1" smtClean="0"/>
-              <a:t>et</a:t>
+              <a:t>Adaptando a sua abordagem à hierarquia </a:t>
             </a:r>
             <a:r>
               <a:rPr lang="pt-PT" dirty="0" smtClean="0"/>
-              <a:t> al. conseguimos uma hierarquia mais apertada. </a:t>
-            </a:r>
+              <a:t>de raios </a:t>
+            </a:r>
+            <a:r>
+              <a:rPr lang="pt-PT" dirty="0" smtClean="0"/>
+              <a:t>conseguimos </a:t>
+            </a:r>
+            <a:r>
+              <a:rPr lang="pt-PT" dirty="0" smtClean="0"/>
+              <a:t>criar uma </a:t>
+            </a:r>
+            <a:r>
+              <a:rPr lang="pt-PT" dirty="0" smtClean="0"/>
+              <a:t>hierarquia mais apertada</a:t>
+            </a:r>
+            <a:r>
+              <a:rPr lang="pt-PT" dirty="0" smtClean="0"/>
+              <a:t>.</a:t>
+            </a:r>
+            <a:endParaRPr lang="pt-PT" dirty="0" smtClean="0"/>
           </a:p>
           <a:p>
             <a:pPr marL="285750" indent="-285750" algn="l">
@@ -11009,7 +11081,15 @@
             </a:pPr>
             <a:r>
               <a:rPr lang="pt-PT" dirty="0" smtClean="0"/>
-              <a:t>Criação rápida e eficiente hierarquia</a:t>
+              <a:t>Criação rápida e </a:t>
+            </a:r>
+            <a:r>
+              <a:rPr lang="pt-PT" dirty="0" smtClean="0"/>
+              <a:t>eficiente da </a:t>
+            </a:r>
+            <a:r>
+              <a:rPr lang="pt-PT" dirty="0" smtClean="0"/>
+              <a:t>hierarquia</a:t>
             </a:r>
           </a:p>
           <a:p>
@@ -11029,15 +11109,15 @@
             </a:pPr>
             <a:r>
               <a:rPr lang="pt-PT" dirty="0" smtClean="0"/>
-              <a:t>Um dos problemas da hierarquia de Roger </a:t>
-            </a:r>
-            <a:r>
-              <a:rPr lang="pt-PT" dirty="0" err="1" smtClean="0"/>
-              <a:t>et</a:t>
+              <a:t>Um dos problemas da hierarquia </a:t>
             </a:r>
             <a:r>
               <a:rPr lang="pt-PT" dirty="0" smtClean="0"/>
-              <a:t> al. é a união dos nós nos níveis superiores da hierarquia, criando cones demasiado largos. </a:t>
+              <a:t>é </a:t>
+            </a:r>
+            <a:r>
+              <a:rPr lang="pt-PT" dirty="0" smtClean="0"/>
+              <a:t>a união dos nós nos níveis superiores da hierarquia, criando cones demasiado largos. </a:t>
             </a:r>
           </a:p>
           <a:p>
@@ -11543,7 +11623,15 @@
             </a:pPr>
             <a:r>
               <a:rPr lang="pt-PT" dirty="0" smtClean="0"/>
-              <a:t>Problema continua a ser o número de testes de interseção.</a:t>
+              <a:t>Grande p</a:t>
+            </a:r>
+            <a:r>
+              <a:rPr lang="pt-PT" dirty="0" smtClean="0"/>
+              <a:t>roblema </a:t>
+            </a:r>
+            <a:r>
+              <a:rPr lang="pt-PT" dirty="0" smtClean="0"/>
+              <a:t>continua a ser o número de testes de interseção.</a:t>
             </a:r>
           </a:p>
           <a:p>
@@ -11553,8 +11641,21 @@
             </a:pPr>
             <a:r>
               <a:rPr lang="pt-PT" dirty="0" smtClean="0"/>
-              <a:t>Desenvolvimentos em GPGPU têm melhorado o Ray-Tracing.</a:t>
-            </a:r>
+              <a:t>Desenvolvimentos em GPGPU têm </a:t>
+            </a:r>
+            <a:r>
+              <a:rPr lang="pt-PT" dirty="0" smtClean="0"/>
+              <a:t>ajudado a tornar o </a:t>
+            </a:r>
+            <a:r>
+              <a:rPr lang="pt-PT" dirty="0" err="1" smtClean="0"/>
+              <a:t>Ray-Tracing</a:t>
+            </a:r>
+            <a:r>
+              <a:rPr lang="pt-PT" dirty="0" smtClean="0"/>
+              <a:t> mais eficiente.</a:t>
+            </a:r>
+            <a:endParaRPr lang="pt-PT" dirty="0" smtClean="0"/>
           </a:p>
           <a:p>
             <a:pPr marL="285750" indent="-285750" algn="l">
@@ -12084,6 +12185,126 @@
   <p:clrMapOvr>
     <a:masterClrMapping/>
   </p:clrMapOvr>
+  <p:timing>
+    <p:tnLst>
+      <p:par>
+        <p:cTn id="1" dur="indefinite" restart="never" nodeType="tmRoot"/>
+      </p:par>
+    </p:tnLst>
+  </p:timing>
+</p:sld>
+</file>
+
+<file path=ppt/slides/slide36.xml><?xml version="1.0" encoding="utf-8"?>
+<p:sld xmlns:a="http://schemas.openxmlformats.org/drawingml/2006/main" xmlns:r="http://schemas.openxmlformats.org/officeDocument/2006/relationships" xmlns:p="http://schemas.openxmlformats.org/presentationml/2006/main">
+  <p:cSld>
+    <p:spTree>
+      <p:nvGrpSpPr>
+        <p:cNvPr id="1" name=""/>
+        <p:cNvGrpSpPr/>
+        <p:nvPr/>
+      </p:nvGrpSpPr>
+      <p:grpSpPr>
+        <a:xfrm>
+          <a:off x="0" y="0"/>
+          <a:ext cx="0" cy="0"/>
+          <a:chOff x="0" y="0"/>
+          <a:chExt cx="0" cy="0"/>
+        </a:xfrm>
+      </p:grpSpPr>
+      <p:sp>
+        <p:nvSpPr>
+          <p:cNvPr id="2" name="Title 1"/>
+          <p:cNvSpPr>
+            <a:spLocks noGrp="1"/>
+          </p:cNvSpPr>
+          <p:nvPr>
+            <p:ph type="ctrTitle"/>
+          </p:nvPr>
+        </p:nvSpPr>
+        <p:spPr>
+          <a:xfrm>
+            <a:off x="1507067" y="15564"/>
+            <a:ext cx="7766936" cy="1211874"/>
+          </a:xfrm>
+        </p:spPr>
+        <p:txBody>
+          <a:bodyPr/>
+          <a:lstStyle/>
+          <a:p>
+            <a:pPr algn="l"/>
+            <a:r>
+              <a:rPr lang="pt-PT" sz="4000" dirty="0" smtClean="0"/>
+              <a:t>Estado Atual</a:t>
+            </a:r>
+            <a:endParaRPr lang="pt-PT" sz="4000" dirty="0"/>
+          </a:p>
+        </p:txBody>
+      </p:sp>
+      <p:sp>
+        <p:nvSpPr>
+          <p:cNvPr id="4" name="Slide Number Placeholder 3"/>
+          <p:cNvSpPr>
+            <a:spLocks noGrp="1"/>
+          </p:cNvSpPr>
+          <p:nvPr>
+            <p:ph type="sldNum" sz="quarter" idx="12"/>
+          </p:nvPr>
+        </p:nvSpPr>
+        <p:spPr/>
+        <p:txBody>
+          <a:bodyPr/>
+          <a:lstStyle/>
+          <a:p>
+            <a:fld id="{20F8321A-7361-4824-BC8D-5BB5EE56E02E}" type="slidenum">
+              <a:rPr lang="pt-PT" sz="2400" smtClean="0"/>
+              <a:t>36</a:t>
+            </a:fld>
+            <a:endParaRPr lang="pt-PT" sz="2400"/>
+          </a:p>
+        </p:txBody>
+      </p:sp>
+      <p:pic>
+        <p:nvPicPr>
+          <p:cNvPr id="6" name="Picture 5"/>
+          <p:cNvPicPr>
+            <a:picLocks noChangeAspect="1"/>
+          </p:cNvPicPr>
+          <p:nvPr/>
+        </p:nvPicPr>
+        <p:blipFill>
+          <a:blip r:embed="rId2"/>
+          <a:stretch>
+            <a:fillRect/>
+          </a:stretch>
+        </p:blipFill>
+        <p:spPr>
+          <a:xfrm>
+            <a:off x="2995394" y="1227438"/>
+            <a:ext cx="4790282" cy="4797814"/>
+          </a:xfrm>
+          <a:prstGeom prst="rect">
+            <a:avLst/>
+          </a:prstGeom>
+        </p:spPr>
+      </p:pic>
+    </p:spTree>
+    <p:extLst>
+      <p:ext uri="{BB962C8B-B14F-4D97-AF65-F5344CB8AC3E}">
+        <p14:creationId xmlns:p14="http://schemas.microsoft.com/office/powerpoint/2010/main" val="589727155"/>
+      </p:ext>
+    </p:extLst>
+  </p:cSld>
+  <p:clrMapOvr>
+    <a:masterClrMapping/>
+  </p:clrMapOvr>
+  <p:timing>
+    <p:tnLst>
+      <p:par>
+        <p:cTn id="1" dur="indefinite" restart="never" nodeType="tmRoot"/>
+      </p:par>
+    </p:tnLst>
+  </p:timing>
 </p:sld>
 </file>
 
@@ -12274,12 +12495,8 @@
               <a:t>Raios </a:t>
             </a:r>
             <a:r>
-              <a:rPr lang="pt-PT" dirty="0" err="1" smtClean="0"/>
-              <a:t>Refracção</a:t>
-            </a:r>
-            <a:r>
-              <a:rPr lang="pt-PT" dirty="0"/>
-              <a:t> </a:t>
+              <a:rPr lang="pt-PT" dirty="0" smtClean="0"/>
+              <a:t>Refração </a:t>
             </a:r>
             <a:r>
               <a:rPr lang="pt-PT" dirty="0" smtClean="0"/>
@@ -12342,6 +12559,13 @@
   <p:clrMapOvr>
     <a:masterClrMapping/>
   </p:clrMapOvr>
+  <p:timing>
+    <p:tnLst>
+      <p:par>
+        <p:cTn id="1" dur="indefinite" restart="never" nodeType="tmRoot"/>
+      </p:par>
+    </p:tnLst>
+  </p:timing>
 </p:sld>
 </file>
 
@@ -12474,6 +12698,13 @@
   <p:clrMapOvr>
     <a:masterClrMapping/>
   </p:clrMapOvr>
+  <p:timing>
+    <p:tnLst>
+      <p:par>
+        <p:cTn id="1" dur="indefinite" restart="never" nodeType="tmRoot"/>
+      </p:par>
+    </p:tnLst>
+  </p:timing>
 </p:sld>
 </file>
 
@@ -12616,6 +12847,13 @@
   <p:clrMapOvr>
     <a:masterClrMapping/>
   </p:clrMapOvr>
+  <p:timing>
+    <p:tnLst>
+      <p:par>
+        <p:cTn id="1" dur="indefinite" restart="never" nodeType="tmRoot"/>
+      </p:par>
+    </p:tnLst>
+  </p:timing>
 </p:sld>
 </file>
 
@@ -12712,6 +12950,17 @@
             </a:r>
           </a:p>
           <a:p>
+            <a:pPr marL="285750" lvl="1" indent="-285750" algn="l">
+              <a:buFont typeface="Arial" panose="020B0604020202020204" pitchFamily="34" charset="0"/>
+              <a:buChar char="•"/>
+            </a:pPr>
+            <a:r>
+              <a:rPr lang="pt-PT" sz="1800" dirty="0" smtClean="0"/>
+              <a:t>Grelhas</a:t>
+            </a:r>
+            <a:endParaRPr lang="pt-PT" sz="1800" dirty="0" smtClean="0"/>
+          </a:p>
+          <a:p>
             <a:pPr marL="285750" indent="-285750" algn="l">
               <a:buFont typeface="Arial" panose="020B0604020202020204" pitchFamily="34" charset="0"/>
               <a:buChar char="•"/>
@@ -12727,16 +12976,6 @@
             <a:r>
               <a:rPr lang="pt-PT" dirty="0" smtClean="0"/>
               <a:t> Volumes)</a:t>
-            </a:r>
-          </a:p>
-          <a:p>
-            <a:pPr marL="742950" lvl="1" indent="-285750" algn="l">
-              <a:buFont typeface="Arial" panose="020B0604020202020204" pitchFamily="34" charset="0"/>
-              <a:buChar char="•"/>
-            </a:pPr>
-            <a:r>
-              <a:rPr lang="pt-PT" dirty="0" smtClean="0"/>
-              <a:t>Grelhas</a:t>
             </a:r>
           </a:p>
           <a:p>
@@ -12806,6 +13045,13 @@
   <p:clrMapOvr>
     <a:masterClrMapping/>
   </p:clrMapOvr>
+  <p:timing>
+    <p:tnLst>
+      <p:par>
+        <p:cTn id="1" dur="indefinite" restart="never" nodeType="tmRoot"/>
+      </p:par>
+    </p:tnLst>
+  </p:timing>
 </p:sld>
 </file>
 
@@ -12994,6 +13240,13 @@
   <p:clrMapOvr>
     <a:masterClrMapping/>
   </p:clrMapOvr>
+  <p:timing>
+    <p:tnLst>
+      <p:par>
+        <p:cTn id="1" dur="indefinite" restart="never" nodeType="tmRoot"/>
+      </p:par>
+    </p:tnLst>
+  </p:timing>
 </p:sld>
 </file>
 
@@ -13130,6 +13383,13 @@
   <p:clrMapOvr>
     <a:masterClrMapping/>
   </p:clrMapOvr>
+  <p:timing>
+    <p:tnLst>
+      <p:par>
+        <p:cTn id="1" dur="indefinite" restart="never" nodeType="tmRoot"/>
+      </p:par>
+    </p:tnLst>
+  </p:timing>
 </p:sld>
 </file>
 

</xml_diff>